<commit_message>
2nd review - 92% (still to do: reread and update intro, related work, evaluation and conclusions)
</commit_message>
<xml_diff>
--- a/dissertation/gfx/charts/Block Diagram2.pptx
+++ b/dissertation/gfx/charts/Block Diagram2.pptx
@@ -3373,22 +3373,14 @@
             <a:pPr algn="ctr"/>
             <a:r>
               <a:rPr lang="pt-PT" sz="700" b="1" dirty="0" smtClean="0"/>
-              <a:t>Voice </a:t>
-            </a:r>
-            <a:r>
-              <a:rPr lang="pt-PT" sz="700" b="1" dirty="0" smtClean="0"/>
-              <a:t>command</a:t>
+              <a:t>Speech command</a:t>
             </a:r>
             <a:br>
               <a:rPr lang="pt-PT" sz="700" b="1" dirty="0" smtClean="0"/>
             </a:br>
             <a:r>
               <a:rPr lang="pt-PT" sz="700" b="1" dirty="0" smtClean="0"/>
-              <a:t>input </a:t>
-            </a:r>
-            <a:r>
-              <a:rPr lang="pt-PT" sz="700" b="1" dirty="0" smtClean="0"/>
-              <a:t>listener</a:t>
+              <a:t>input listener</a:t>
             </a:r>
             <a:endParaRPr lang="en-US" sz="700" b="1" dirty="0"/>
           </a:p>
@@ -3431,11 +3423,7 @@
             <a:pPr algn="ctr"/>
             <a:r>
               <a:rPr lang="pt-PT" sz="700" b="1" dirty="0" smtClean="0"/>
-              <a:t>Shape </a:t>
-            </a:r>
-            <a:r>
-              <a:rPr lang="pt-PT" sz="700" b="1" dirty="0" smtClean="0"/>
-              <a:t>Manager</a:t>
+              <a:t>Shape Manager</a:t>
             </a:r>
             <a:endParaRPr lang="en-US" sz="700" b="1" dirty="0"/>
           </a:p>
@@ -3449,8 +3437,8 @@
         </p:nvSpPr>
         <p:spPr>
           <a:xfrm>
-            <a:off x="511877" y="1340000"/>
-            <a:ext cx="1022364" cy="292104"/>
+            <a:off x="1311573" y="1338408"/>
+            <a:ext cx="737440" cy="292104"/>
           </a:xfrm>
           <a:prstGeom prst="rect">
             <a:avLst/>
@@ -3478,14 +3466,14 @@
             <a:pPr algn="ctr"/>
             <a:r>
               <a:rPr lang="pt-PT" sz="700" b="1" dirty="0" smtClean="0"/>
-              <a:t>2D Stroke</a:t>
+              <a:t>2D Gate/Menu</a:t>
             </a:r>
             <a:br>
               <a:rPr lang="pt-PT" sz="700" b="1" dirty="0" smtClean="0"/>
             </a:br>
             <a:r>
               <a:rPr lang="pt-PT" sz="700" b="1" dirty="0" smtClean="0"/>
-              <a:t>Gate-Based Interface</a:t>
+              <a:t>Interface</a:t>
             </a:r>
             <a:endParaRPr lang="en-US" sz="700" b="1" dirty="0"/>
           </a:p>
@@ -3535,11 +3523,7 @@
             <a:pPr algn="ctr"/>
             <a:r>
               <a:rPr lang="pt-PT" sz="700" dirty="0" smtClean="0"/>
-              <a:t>(shape recognizer</a:t>
-            </a:r>
-            <a:r>
-              <a:rPr lang="pt-PT" sz="700" dirty="0" smtClean="0"/>
-              <a:t>)</a:t>
+              <a:t>(shape recognizer)</a:t>
             </a:r>
             <a:endParaRPr lang="en-US" sz="700" dirty="0"/>
           </a:p>
@@ -3553,7 +3537,7 @@
         </p:nvSpPr>
         <p:spPr>
           <a:xfrm>
-            <a:off x="1607267" y="608152"/>
+            <a:off x="511877" y="608152"/>
             <a:ext cx="1022364" cy="292104"/>
           </a:xfrm>
           <a:prstGeom prst="rect">
@@ -3716,15 +3700,7 @@
             <a:pPr algn="ctr"/>
             <a:r>
               <a:rPr lang="pt-PT" sz="700" b="1" dirty="0" smtClean="0"/>
-              <a:t>Laser/mouse </a:t>
-            </a:r>
-            <a:r>
-              <a:rPr lang="pt-PT" sz="700" b="1" dirty="0" smtClean="0"/>
-              <a:t>input </a:t>
-            </a:r>
-            <a:r>
-              <a:rPr lang="pt-PT" sz="700" b="1" dirty="0" smtClean="0"/>
-              <a:t>listener</a:t>
+              <a:t>Laser/mouse input listener</a:t>
             </a:r>
             <a:endParaRPr lang="en-US" sz="700" b="1" dirty="0"/>
           </a:p>
@@ -3767,15 +3743,7 @@
             <a:pPr algn="ctr"/>
             <a:r>
               <a:rPr lang="pt-PT" sz="700" b="1" dirty="0" smtClean="0"/>
-              <a:t>Tracking postures </a:t>
-            </a:r>
-            <a:r>
-              <a:rPr lang="pt-PT" sz="700" b="1" dirty="0" smtClean="0"/>
-              <a:t>input </a:t>
-            </a:r>
-            <a:r>
-              <a:rPr lang="pt-PT" sz="700" b="1" dirty="0" smtClean="0"/>
-              <a:t>listener</a:t>
+              <a:t>Tracking postures input listener</a:t>
             </a:r>
             <a:endParaRPr lang="en-US" sz="700" b="1" dirty="0"/>
           </a:p>
@@ -3784,57 +3752,13 @@
       <p:cxnSp>
         <p:nvCxnSpPr>
           <p:cNvPr id="73" name="Straight Arrow Connector 72"/>
-          <p:cNvCxnSpPr>
-            <a:stCxn id="36" idx="2"/>
-            <a:endCxn id="50" idx="0"/>
-          </p:cNvCxnSpPr>
+          <p:cNvCxnSpPr/>
           <p:nvPr/>
         </p:nvCxnSpPr>
         <p:spPr>
-          <a:xfrm rot="5400000">
-            <a:off x="785770" y="1869393"/>
-            <a:ext cx="474578" cy="1588"/>
-          </a:xfrm>
-          <a:prstGeom prst="straightConnector1">
-            <a:avLst/>
-          </a:prstGeom>
-          <a:ln>
-            <a:solidFill>
-              <a:schemeClr val="tx1">
-                <a:lumMod val="65000"/>
-                <a:lumOff val="35000"/>
-              </a:schemeClr>
-            </a:solidFill>
-            <a:tailEnd type="arrow"/>
-          </a:ln>
-        </p:spPr>
-        <p:style>
-          <a:lnRef idx="1">
-            <a:schemeClr val="accent1"/>
-          </a:lnRef>
-          <a:fillRef idx="0">
-            <a:schemeClr val="accent1"/>
-          </a:fillRef>
-          <a:effectRef idx="0">
-            <a:schemeClr val="accent1"/>
-          </a:effectRef>
-          <a:fontRef idx="minor">
-            <a:schemeClr val="tx1"/>
-          </a:fontRef>
-        </p:style>
-      </p:cxnSp>
-      <p:cxnSp>
-        <p:nvCxnSpPr>
-          <p:cNvPr id="85" name="Straight Arrow Connector 72"/>
-          <p:cNvCxnSpPr>
-            <a:endCxn id="36" idx="3"/>
-          </p:cNvCxnSpPr>
-          <p:nvPr/>
-        </p:nvCxnSpPr>
-        <p:spPr>
-          <a:xfrm rot="10800000">
-            <a:off x="1534241" y="1486053"/>
-            <a:ext cx="523950" cy="9"/>
+          <a:xfrm rot="16200000" flipH="1">
+            <a:off x="641716" y="1869389"/>
+            <a:ext cx="477760" cy="2"/>
           </a:xfrm>
           <a:prstGeom prst="straightConnector1">
             <a:avLst/>
@@ -3949,46 +3873,6 @@
       </p:sp>
       <p:cxnSp>
         <p:nvCxnSpPr>
-          <p:cNvPr id="125" name="Shape 124"/>
-          <p:cNvCxnSpPr/>
-          <p:nvPr/>
-        </p:nvCxnSpPr>
-        <p:spPr>
-          <a:xfrm rot="10800000">
-            <a:off x="2119244" y="1858942"/>
-            <a:ext cx="882700" cy="247741"/>
-          </a:xfrm>
-          <a:prstGeom prst="bentConnector3">
-            <a:avLst>
-              <a:gd name="adj1" fmla="val 363"/>
-            </a:avLst>
-          </a:prstGeom>
-          <a:ln>
-            <a:solidFill>
-              <a:schemeClr val="tx1">
-                <a:lumMod val="65000"/>
-                <a:lumOff val="35000"/>
-              </a:schemeClr>
-            </a:solidFill>
-          </a:ln>
-        </p:spPr>
-        <p:style>
-          <a:lnRef idx="1">
-            <a:schemeClr val="accent1"/>
-          </a:lnRef>
-          <a:fillRef idx="0">
-            <a:schemeClr val="accent1"/>
-          </a:fillRef>
-          <a:effectRef idx="0">
-            <a:schemeClr val="accent1"/>
-          </a:effectRef>
-          <a:fontRef idx="minor">
-            <a:schemeClr val="tx1"/>
-          </a:fontRef>
-        </p:style>
-      </p:cxnSp>
-      <p:cxnSp>
-        <p:nvCxnSpPr>
           <p:cNvPr id="126" name="Shape 125"/>
           <p:cNvCxnSpPr>
             <a:stCxn id="70" idx="0"/>
@@ -4187,56 +4071,16 @@
       </p:cxnSp>
       <p:cxnSp>
         <p:nvCxnSpPr>
-          <p:cNvPr id="191" name="Straight Arrow Connector 72"/>
-          <p:cNvCxnSpPr/>
-          <p:nvPr/>
-        </p:nvCxnSpPr>
-        <p:spPr>
-          <a:xfrm rot="16200000" flipH="1">
-            <a:off x="3131110" y="526213"/>
-            <a:ext cx="163873" cy="3"/>
-          </a:xfrm>
-          <a:prstGeom prst="straightConnector1">
-            <a:avLst/>
-          </a:prstGeom>
-          <a:ln>
-            <a:solidFill>
-              <a:schemeClr val="tx1">
-                <a:lumMod val="65000"/>
-                <a:lumOff val="35000"/>
-              </a:schemeClr>
-            </a:solidFill>
-            <a:tailEnd type="arrow"/>
-          </a:ln>
-        </p:spPr>
-        <p:style>
-          <a:lnRef idx="1">
-            <a:schemeClr val="accent1"/>
-          </a:lnRef>
-          <a:fillRef idx="0">
-            <a:schemeClr val="accent1"/>
-          </a:fillRef>
-          <a:effectRef idx="0">
-            <a:schemeClr val="accent1"/>
-          </a:effectRef>
-          <a:fontRef idx="minor">
-            <a:schemeClr val="tx1"/>
-          </a:fontRef>
-        </p:style>
-      </p:cxnSp>
-      <p:cxnSp>
-        <p:nvCxnSpPr>
           <p:cNvPr id="193" name="Straight Arrow Connector 72"/>
           <p:cNvCxnSpPr>
             <a:stCxn id="42" idx="0"/>
-            <a:endCxn id="34" idx="2"/>
           </p:cNvCxnSpPr>
           <p:nvPr/>
         </p:nvCxnSpPr>
         <p:spPr>
-          <a:xfrm rot="5400000" flipH="1" flipV="1">
-            <a:off x="2998351" y="1115745"/>
-            <a:ext cx="438156" cy="7179"/>
+          <a:xfrm rot="16200000" flipV="1">
+            <a:off x="3086046" y="1210617"/>
+            <a:ext cx="254797" cy="793"/>
           </a:xfrm>
           <a:prstGeom prst="straightConnector1">
             <a:avLst/>
@@ -4345,16 +4189,62 @@
           </a:fontRef>
         </p:style>
       </p:cxnSp>
+      <p:sp>
+        <p:nvSpPr>
+          <p:cNvPr id="58" name="Rectangle 57"/>
+          <p:cNvSpPr/>
+          <p:nvPr/>
+        </p:nvSpPr>
+        <p:spPr>
+          <a:xfrm>
+            <a:off x="511877" y="1338408"/>
+            <a:ext cx="737440" cy="292104"/>
+          </a:xfrm>
+          <a:prstGeom prst="rect">
+            <a:avLst/>
+          </a:prstGeom>
+          <a:ln/>
+        </p:spPr>
+        <p:style>
+          <a:lnRef idx="1">
+            <a:schemeClr val="accent1"/>
+          </a:lnRef>
+          <a:fillRef idx="3">
+            <a:schemeClr val="accent1"/>
+          </a:fillRef>
+          <a:effectRef idx="2">
+            <a:schemeClr val="accent1"/>
+          </a:effectRef>
+          <a:fontRef idx="minor">
+            <a:schemeClr val="lt1"/>
+          </a:fontRef>
+        </p:style>
+        <p:txBody>
+          <a:bodyPr lIns="91416" tIns="45708" rIns="91416" bIns="45708" rtlCol="0" anchor="ctr"/>
+          <a:lstStyle/>
+          <a:p>
+            <a:pPr algn="ctr"/>
+            <a:r>
+              <a:rPr lang="pt-PT" sz="700" b="1" dirty="0" smtClean="0"/>
+              <a:t>3D Scene Management</a:t>
+            </a:r>
+            <a:endParaRPr lang="en-US" sz="700" b="1" dirty="0"/>
+          </a:p>
+        </p:txBody>
+      </p:sp>
       <p:cxnSp>
         <p:nvCxnSpPr>
-          <p:cNvPr id="216" name="Straight Arrow Connector 72"/>
-          <p:cNvCxnSpPr/>
+          <p:cNvPr id="118" name="Straight Arrow Connector 72"/>
+          <p:cNvCxnSpPr>
+            <a:stCxn id="42" idx="1"/>
+            <a:endCxn id="36" idx="3"/>
+          </p:cNvCxnSpPr>
           <p:nvPr/>
         </p:nvCxnSpPr>
         <p:spPr>
-          <a:xfrm rot="5400000">
-            <a:off x="2035721" y="523832"/>
-            <a:ext cx="163075" cy="3970"/>
+          <a:xfrm rot="10800000">
+            <a:off x="2049014" y="1484460"/>
+            <a:ext cx="653645" cy="4"/>
           </a:xfrm>
           <a:prstGeom prst="straightConnector1">
             <a:avLst/>
@@ -4386,54 +4276,16 @@
       </p:cxnSp>
       <p:cxnSp>
         <p:nvCxnSpPr>
-          <p:cNvPr id="218" name="Shape 152"/>
+          <p:cNvPr id="131" name="Straight Arrow Connector 72"/>
           <p:cNvCxnSpPr>
-            <a:endCxn id="36" idx="0"/>
+            <a:stCxn id="36" idx="0"/>
           </p:cNvCxnSpPr>
           <p:nvPr/>
         </p:nvCxnSpPr>
         <p:spPr>
-          <a:xfrm rot="10800000" flipV="1">
-            <a:off x="1023059" y="444280"/>
-            <a:ext cx="2191576" cy="895719"/>
-          </a:xfrm>
-          <a:prstGeom prst="bentConnector2">
-            <a:avLst/>
-          </a:prstGeom>
-          <a:ln>
-            <a:solidFill>
-              <a:schemeClr val="tx1">
-                <a:lumMod val="65000"/>
-                <a:lumOff val="35000"/>
-              </a:schemeClr>
-            </a:solidFill>
-          </a:ln>
-        </p:spPr>
-        <p:style>
-          <a:lnRef idx="1">
-            <a:schemeClr val="accent1"/>
-          </a:lnRef>
-          <a:fillRef idx="0">
-            <a:schemeClr val="accent1"/>
-          </a:fillRef>
-          <a:effectRef idx="0">
-            <a:schemeClr val="accent1"/>
-          </a:effectRef>
-          <a:fontRef idx="minor">
-            <a:schemeClr val="tx1"/>
-          </a:fontRef>
-        </p:style>
-      </p:cxnSp>
-      <p:cxnSp>
-        <p:nvCxnSpPr>
-          <p:cNvPr id="229" name="Straight Arrow Connector 72"/>
-          <p:cNvCxnSpPr/>
-          <p:nvPr/>
-        </p:nvCxnSpPr>
-        <p:spPr>
           <a:xfrm rot="5400000" flipH="1" flipV="1">
-            <a:off x="1515236" y="1504263"/>
-            <a:ext cx="1204838" cy="1588"/>
+            <a:off x="1552500" y="1210615"/>
+            <a:ext cx="255587" cy="1588"/>
           </a:xfrm>
           <a:prstGeom prst="straightConnector1">
             <a:avLst/>
@@ -4465,103 +4317,14 @@
       </p:cxnSp>
       <p:cxnSp>
         <p:nvCxnSpPr>
-          <p:cNvPr id="247" name="Straight Connector 246"/>
-          <p:cNvCxnSpPr>
-            <a:stCxn id="42" idx="1"/>
-          </p:cNvCxnSpPr>
-          <p:nvPr/>
-        </p:nvCxnSpPr>
-        <p:spPr>
-          <a:xfrm rot="10800000" flipV="1">
-            <a:off x="2162936" y="1484464"/>
-            <a:ext cx="539722" cy="1588"/>
-          </a:xfrm>
-          <a:prstGeom prst="line">
-            <a:avLst/>
-          </a:prstGeom>
-          <a:ln>
-            <a:solidFill>
-              <a:schemeClr val="tx1">
-                <a:lumMod val="65000"/>
-                <a:lumOff val="35000"/>
-              </a:schemeClr>
-            </a:solidFill>
-          </a:ln>
-        </p:spPr>
-        <p:style>
-          <a:lnRef idx="1">
-            <a:schemeClr val="accent1"/>
-          </a:lnRef>
-          <a:fillRef idx="0">
-            <a:schemeClr val="accent1"/>
-          </a:fillRef>
-          <a:effectRef idx="0">
-            <a:schemeClr val="accent1"/>
-          </a:effectRef>
-          <a:fontRef idx="minor">
-            <a:schemeClr val="tx1"/>
-          </a:fontRef>
-        </p:style>
-      </p:cxnSp>
-      <p:sp>
-        <p:nvSpPr>
-          <p:cNvPr id="249" name="Arc 248"/>
-          <p:cNvSpPr/>
-          <p:nvPr/>
-        </p:nvSpPr>
-        <p:spPr>
-          <a:xfrm>
-            <a:off x="2058191" y="1446800"/>
-            <a:ext cx="109539" cy="83524"/>
-          </a:xfrm>
-          <a:prstGeom prst="arc">
-            <a:avLst>
-              <a:gd name="adj1" fmla="val 10695383"/>
-              <a:gd name="adj2" fmla="val 0"/>
-            </a:avLst>
-          </a:prstGeom>
-          <a:ln>
-            <a:solidFill>
-              <a:schemeClr val="tx1">
-                <a:lumMod val="65000"/>
-                <a:lumOff val="35000"/>
-              </a:schemeClr>
-            </a:solidFill>
-          </a:ln>
-        </p:spPr>
-        <p:style>
-          <a:lnRef idx="1">
-            <a:schemeClr val="accent1"/>
-          </a:lnRef>
-          <a:fillRef idx="0">
-            <a:schemeClr val="accent1"/>
-          </a:fillRef>
-          <a:effectRef idx="0">
-            <a:schemeClr val="accent1"/>
-          </a:effectRef>
-          <a:fontRef idx="minor">
-            <a:schemeClr val="tx1"/>
-          </a:fontRef>
-        </p:style>
-        <p:txBody>
-          <a:bodyPr rtlCol="0" anchor="ctr"/>
-          <a:lstStyle/>
-          <a:p>
-            <a:pPr algn="ctr"/>
-            <a:endParaRPr lang="en-US"/>
-          </a:p>
-        </p:txBody>
-      </p:sp>
-      <p:cxnSp>
-        <p:nvCxnSpPr>
-          <p:cNvPr id="262" name="Straight Arrow Connector 72"/>
+          <p:cNvPr id="135" name="Straight Arrow Connector 72"/>
           <p:cNvCxnSpPr/>
           <p:nvPr/>
         </p:nvCxnSpPr>
         <p:spPr>
-          <a:xfrm rot="16200000" flipV="1">
-            <a:off x="3869163" y="992728"/>
-            <a:ext cx="180183" cy="3"/>
+          <a:xfrm rot="5400000">
+            <a:off x="753595" y="1209817"/>
+            <a:ext cx="253996" cy="4"/>
           </a:xfrm>
           <a:prstGeom prst="straightConnector1">
             <a:avLst/>
@@ -4593,14 +4356,222 @@
       </p:cxnSp>
       <p:cxnSp>
         <p:nvCxnSpPr>
-          <p:cNvPr id="266" name="Straight Connector 265"/>
+          <p:cNvPr id="138" name="Straight Arrow Connector 137"/>
           <p:cNvCxnSpPr/>
           <p:nvPr/>
         </p:nvCxnSpPr>
         <p:spPr>
-          <a:xfrm rot="10800000">
-            <a:off x="3213047" y="1082821"/>
-            <a:ext cx="746208" cy="1"/>
+          <a:xfrm rot="10800000" flipV="1">
+            <a:off x="1534241" y="750631"/>
+            <a:ext cx="791416" cy="1"/>
+          </a:xfrm>
+          <a:prstGeom prst="straightConnector1">
+            <a:avLst/>
+          </a:prstGeom>
+          <a:ln>
+            <a:solidFill>
+              <a:schemeClr val="tx1">
+                <a:lumMod val="65000"/>
+                <a:lumOff val="35000"/>
+              </a:schemeClr>
+            </a:solidFill>
+            <a:tailEnd type="arrow"/>
+          </a:ln>
+        </p:spPr>
+        <p:style>
+          <a:lnRef idx="1">
+            <a:schemeClr val="accent1"/>
+          </a:lnRef>
+          <a:fillRef idx="0">
+            <a:schemeClr val="accent1"/>
+          </a:fillRef>
+          <a:effectRef idx="0">
+            <a:schemeClr val="accent1"/>
+          </a:effectRef>
+          <a:fontRef idx="minor">
+            <a:schemeClr val="tx1"/>
+          </a:fontRef>
+        </p:style>
+      </p:cxnSp>
+      <p:cxnSp>
+        <p:nvCxnSpPr>
+          <p:cNvPr id="143" name="Elbow Connector 142"/>
+          <p:cNvCxnSpPr/>
+          <p:nvPr/>
+        </p:nvCxnSpPr>
+        <p:spPr>
+          <a:xfrm>
+            <a:off x="2325657" y="2041505"/>
+            <a:ext cx="785823" cy="66765"/>
+          </a:xfrm>
+          <a:prstGeom prst="bentConnector3">
+            <a:avLst>
+              <a:gd name="adj1" fmla="val 101488"/>
+            </a:avLst>
+          </a:prstGeom>
+          <a:ln>
+            <a:solidFill>
+              <a:schemeClr val="tx1">
+                <a:lumMod val="65000"/>
+                <a:lumOff val="35000"/>
+              </a:schemeClr>
+            </a:solidFill>
+          </a:ln>
+        </p:spPr>
+        <p:style>
+          <a:lnRef idx="1">
+            <a:schemeClr val="accent1"/>
+          </a:lnRef>
+          <a:fillRef idx="0">
+            <a:schemeClr val="accent1"/>
+          </a:fillRef>
+          <a:effectRef idx="0">
+            <a:schemeClr val="accent1"/>
+          </a:effectRef>
+          <a:fontRef idx="minor">
+            <a:schemeClr val="tx1"/>
+          </a:fontRef>
+        </p:style>
+      </p:cxnSp>
+      <p:cxnSp>
+        <p:nvCxnSpPr>
+          <p:cNvPr id="146" name="Shape 145"/>
+          <p:cNvCxnSpPr>
+            <a:stCxn id="36" idx="2"/>
+          </p:cNvCxnSpPr>
+          <p:nvPr/>
+        </p:nvCxnSpPr>
+        <p:spPr>
+          <a:xfrm rot="5400000">
+            <a:off x="1239257" y="1271852"/>
+            <a:ext cx="82377" cy="799696"/>
+          </a:xfrm>
+          <a:prstGeom prst="bentConnector2">
+            <a:avLst/>
+          </a:prstGeom>
+          <a:ln>
+            <a:solidFill>
+              <a:schemeClr val="tx1">
+                <a:lumMod val="75000"/>
+                <a:lumOff val="25000"/>
+              </a:schemeClr>
+            </a:solidFill>
+          </a:ln>
+        </p:spPr>
+        <p:style>
+          <a:lnRef idx="1">
+            <a:schemeClr val="accent1"/>
+          </a:lnRef>
+          <a:fillRef idx="0">
+            <a:schemeClr val="accent1"/>
+          </a:fillRef>
+          <a:effectRef idx="0">
+            <a:schemeClr val="accent1"/>
+          </a:effectRef>
+          <a:fontRef idx="minor">
+            <a:schemeClr val="tx1"/>
+          </a:fontRef>
+        </p:style>
+      </p:cxnSp>
+      <p:cxnSp>
+        <p:nvCxnSpPr>
+          <p:cNvPr id="151" name="Straight Connector 150"/>
+          <p:cNvCxnSpPr>
+            <a:endCxn id="11" idx="0"/>
+          </p:cNvCxnSpPr>
+          <p:nvPr/>
+        </p:nvCxnSpPr>
+        <p:spPr>
+          <a:xfrm rot="16200000" flipH="1">
+            <a:off x="2050269" y="1831294"/>
+            <a:ext cx="550776" cy="1588"/>
+          </a:xfrm>
+          <a:prstGeom prst="line">
+            <a:avLst/>
+          </a:prstGeom>
+          <a:ln>
+            <a:solidFill>
+              <a:schemeClr val="tx1">
+                <a:lumMod val="65000"/>
+                <a:lumOff val="35000"/>
+              </a:schemeClr>
+            </a:solidFill>
+          </a:ln>
+        </p:spPr>
+        <p:style>
+          <a:lnRef idx="1">
+            <a:schemeClr val="accent1"/>
+          </a:lnRef>
+          <a:fillRef idx="0">
+            <a:schemeClr val="accent1"/>
+          </a:fillRef>
+          <a:effectRef idx="0">
+            <a:schemeClr val="accent1"/>
+          </a:effectRef>
+          <a:fontRef idx="minor">
+            <a:schemeClr val="tx1"/>
+          </a:fontRef>
+        </p:style>
+      </p:cxnSp>
+      <p:sp>
+        <p:nvSpPr>
+          <p:cNvPr id="154" name="Arc 153"/>
+          <p:cNvSpPr/>
+          <p:nvPr/>
+        </p:nvSpPr>
+        <p:spPr>
+          <a:xfrm>
+            <a:off x="2250248" y="1409652"/>
+            <a:ext cx="146052" cy="149625"/>
+          </a:xfrm>
+          <a:prstGeom prst="arc">
+            <a:avLst>
+              <a:gd name="adj1" fmla="val 16200000"/>
+              <a:gd name="adj2" fmla="val 5358165"/>
+            </a:avLst>
+          </a:prstGeom>
+          <a:ln>
+            <a:solidFill>
+              <a:schemeClr val="tx1">
+                <a:lumMod val="75000"/>
+                <a:lumOff val="25000"/>
+              </a:schemeClr>
+            </a:solidFill>
+          </a:ln>
+        </p:spPr>
+        <p:style>
+          <a:lnRef idx="1">
+            <a:schemeClr val="accent1"/>
+          </a:lnRef>
+          <a:fillRef idx="0">
+            <a:schemeClr val="accent1"/>
+          </a:fillRef>
+          <a:effectRef idx="0">
+            <a:schemeClr val="accent1"/>
+          </a:effectRef>
+          <a:fontRef idx="minor">
+            <a:schemeClr val="tx1"/>
+          </a:fontRef>
+        </p:style>
+        <p:txBody>
+          <a:bodyPr rtlCol="0" anchor="ctr"/>
+          <a:lstStyle/>
+          <a:p>
+            <a:pPr algn="ctr"/>
+            <a:endParaRPr lang="en-US"/>
+          </a:p>
+        </p:txBody>
+      </p:sp>
+      <p:cxnSp>
+        <p:nvCxnSpPr>
+          <p:cNvPr id="157" name="Straight Connector 156"/>
+          <p:cNvCxnSpPr/>
+          <p:nvPr/>
+        </p:nvCxnSpPr>
+        <p:spPr>
+          <a:xfrm rot="5400000">
+            <a:off x="1993764" y="1080143"/>
+            <a:ext cx="659021" cy="1588"/>
           </a:xfrm>
           <a:prstGeom prst="line">
             <a:avLst/>

</xml_diff>